<commit_message>
vault backup: 2025-12-08 23:10:07
</commit_message>
<xml_diff>
--- a/IT/webp.pptx
+++ b/IT/webp.pptx
@@ -139,7 +139,7 @@
       </p:grpSpPr>
       <p:sp>
         <p:nvSpPr>
-          <p:cNvPr id="773197245" name="Верхний колонтитул 1"/>
+          <p:cNvPr id="2012657143" name="Верхний колонтитул 1"/>
           <p:cNvSpPr>
             <a:spLocks noGrp="1"/>
           </p:cNvSpPr>
@@ -173,7 +173,7 @@
       </p:sp>
       <p:sp>
         <p:nvSpPr>
-          <p:cNvPr id="465389872" name="Дата 2"/>
+          <p:cNvPr id="1788859787" name="Дата 2"/>
           <p:cNvSpPr>
             <a:spLocks noGrp="1"/>
           </p:cNvSpPr>
@@ -211,7 +211,7 @@
       </p:sp>
       <p:sp>
         <p:nvSpPr>
-          <p:cNvPr id="329946941" name="Рисунок 3"/>
+          <p:cNvPr id="1285655586" name="Рисунок 3"/>
           <p:cNvSpPr>
             <a:spLocks noChangeAspect="1" noGrp="1" noRot="1"/>
           </p:cNvSpPr>
@@ -247,7 +247,7 @@
       </p:sp>
       <p:sp>
         <p:nvSpPr>
-          <p:cNvPr id="224047754" name="Заметка 4"/>
+          <p:cNvPr id="670752610" name="Заметка 4"/>
           <p:cNvSpPr>
             <a:spLocks noGrp="1"/>
           </p:cNvSpPr>
@@ -321,7 +321,7 @@
       </p:sp>
       <p:sp>
         <p:nvSpPr>
-          <p:cNvPr id="1927321162" name="Нижний колонтитул 5"/>
+          <p:cNvPr id="1284618143" name="Нижний колонтитул 5"/>
           <p:cNvSpPr>
             <a:spLocks noGrp="1"/>
           </p:cNvSpPr>
@@ -355,7 +355,7 @@
       </p:sp>
       <p:sp>
         <p:nvSpPr>
-          <p:cNvPr id="1921746252" name="Номер слайда 6"/>
+          <p:cNvPr id="1512423613" name="Номер слайда 6"/>
           <p:cNvSpPr>
             <a:spLocks noGrp="1"/>
           </p:cNvSpPr>
@@ -508,7 +508,7 @@
       </p:grpSpPr>
       <p:sp>
         <p:nvSpPr>
-          <p:cNvPr id="414525467" name="Рисунок 1"/>
+          <p:cNvPr id="1047999483" name="Рисунок 1"/>
           <p:cNvSpPr>
             <a:spLocks noChangeAspect="1" noGrp="1" noRot="1"/>
           </p:cNvSpPr>
@@ -525,7 +525,7 @@
       </p:sp>
       <p:sp>
         <p:nvSpPr>
-          <p:cNvPr id="910079524" name="Текст 2"/>
+          <p:cNvPr id="196682881" name="Текст 2"/>
           <p:cNvSpPr>
             <a:spLocks noGrp="1"/>
           </p:cNvSpPr>
@@ -550,7 +550,7 @@
       </p:sp>
       <p:sp>
         <p:nvSpPr>
-          <p:cNvPr id="328600344" name="Номер слайда 3"/>
+          <p:cNvPr id="1613064436" name="Номер слайда 3"/>
           <p:cNvSpPr>
             <a:spLocks noGrp="1"/>
           </p:cNvSpPr>
@@ -601,7 +601,7 @@
       </p:grpSpPr>
       <p:sp>
         <p:nvSpPr>
-          <p:cNvPr id="1413464366" name="Slide Image Placeholder 1"/>
+          <p:cNvPr id="1912704742" name="Slide Image Placeholder 1"/>
           <p:cNvSpPr>
             <a:spLocks noChangeAspect="1" noGrp="1" noRot="1"/>
           </p:cNvSpPr>
@@ -613,7 +613,7 @@
       </p:sp>
       <p:sp>
         <p:nvSpPr>
-          <p:cNvPr id="1186934608" name="Notes Placeholder 2"/>
+          <p:cNvPr id="253078807" name="Notes Placeholder 2"/>
           <p:cNvSpPr>
             <a:spLocks noGrp="1"/>
           </p:cNvSpPr>
@@ -635,7 +635,7 @@
       </p:sp>
       <p:sp>
         <p:nvSpPr>
-          <p:cNvPr id="1518599215" name="Slide Number Placeholder 3"/>
+          <p:cNvPr id="467146613" name="Slide Number Placeholder 3"/>
           <p:cNvSpPr>
             <a:spLocks noGrp="1"/>
           </p:cNvSpPr>
@@ -686,7 +686,7 @@
       </p:grpSpPr>
       <p:sp>
         <p:nvSpPr>
-          <p:cNvPr id="1384297492" name="Slide Image Placeholder 1"/>
+          <p:cNvPr id="87373429" name="Slide Image Placeholder 1"/>
           <p:cNvSpPr>
             <a:spLocks noChangeAspect="1" noGrp="1" noRot="1"/>
           </p:cNvSpPr>
@@ -698,7 +698,7 @@
       </p:sp>
       <p:sp>
         <p:nvSpPr>
-          <p:cNvPr id="1459795922" name="Notes Placeholder 2"/>
+          <p:cNvPr id="679953589" name="Notes Placeholder 2"/>
           <p:cNvSpPr>
             <a:spLocks noGrp="1"/>
           </p:cNvSpPr>
@@ -720,7 +720,7 @@
       </p:sp>
       <p:sp>
         <p:nvSpPr>
-          <p:cNvPr id="272017822" name="Slide Number Placeholder 3"/>
+          <p:cNvPr id="244419293" name="Slide Number Placeholder 3"/>
           <p:cNvSpPr>
             <a:spLocks noGrp="1"/>
           </p:cNvSpPr>
@@ -771,7 +771,7 @@
       </p:grpSpPr>
       <p:sp>
         <p:nvSpPr>
-          <p:cNvPr id="1857317254" name="Slide Image Placeholder 1"/>
+          <p:cNvPr id="1245333605" name="Slide Image Placeholder 1"/>
           <p:cNvSpPr>
             <a:spLocks noChangeAspect="1" noGrp="1" noRot="1"/>
           </p:cNvSpPr>
@@ -783,7 +783,7 @@
       </p:sp>
       <p:sp>
         <p:nvSpPr>
-          <p:cNvPr id="2131089802" name="Notes Placeholder 2"/>
+          <p:cNvPr id="693819786" name="Notes Placeholder 2"/>
           <p:cNvSpPr>
             <a:spLocks noGrp="1"/>
           </p:cNvSpPr>
@@ -805,7 +805,7 @@
       </p:sp>
       <p:sp>
         <p:nvSpPr>
-          <p:cNvPr id="901340625" name="Slide Number Placeholder 3"/>
+          <p:cNvPr id="1893017763" name="Slide Number Placeholder 3"/>
           <p:cNvSpPr>
             <a:spLocks noGrp="1"/>
           </p:cNvSpPr>
@@ -856,7 +856,7 @@
       </p:grpSpPr>
       <p:sp>
         <p:nvSpPr>
-          <p:cNvPr id="1950147358" name="Slide Image Placeholder 1"/>
+          <p:cNvPr id="2002851116" name="Slide Image Placeholder 1"/>
           <p:cNvSpPr>
             <a:spLocks noChangeAspect="1" noGrp="1" noRot="1"/>
           </p:cNvSpPr>
@@ -868,7 +868,7 @@
       </p:sp>
       <p:sp>
         <p:nvSpPr>
-          <p:cNvPr id="799427944" name="Notes Placeholder 2"/>
+          <p:cNvPr id="181676810" name="Notes Placeholder 2"/>
           <p:cNvSpPr>
             <a:spLocks noGrp="1"/>
           </p:cNvSpPr>
@@ -890,7 +890,7 @@
       </p:sp>
       <p:sp>
         <p:nvSpPr>
-          <p:cNvPr id="1057224893" name="Slide Number Placeholder 3"/>
+          <p:cNvPr id="1327297130" name="Slide Number Placeholder 3"/>
           <p:cNvSpPr>
             <a:spLocks noGrp="1"/>
           </p:cNvSpPr>
@@ -941,7 +941,7 @@
       </p:grpSpPr>
       <p:sp>
         <p:nvSpPr>
-          <p:cNvPr id="764478522" name="Slide Image Placeholder 1"/>
+          <p:cNvPr id="273830543" name="Slide Image Placeholder 1"/>
           <p:cNvSpPr>
             <a:spLocks noChangeAspect="1" noGrp="1" noRot="1"/>
           </p:cNvSpPr>
@@ -953,7 +953,7 @@
       </p:sp>
       <p:sp>
         <p:nvSpPr>
-          <p:cNvPr id="152238197" name="Notes Placeholder 2"/>
+          <p:cNvPr id="1929908844" name="Notes Placeholder 2"/>
           <p:cNvSpPr>
             <a:spLocks noGrp="1"/>
           </p:cNvSpPr>
@@ -975,7 +975,7 @@
       </p:sp>
       <p:sp>
         <p:nvSpPr>
-          <p:cNvPr id="97682574" name="Slide Number Placeholder 3"/>
+          <p:cNvPr id="520503936" name="Slide Number Placeholder 3"/>
           <p:cNvSpPr>
             <a:spLocks noGrp="1"/>
           </p:cNvSpPr>
@@ -1026,7 +1026,7 @@
       </p:grpSpPr>
       <p:sp>
         <p:nvSpPr>
-          <p:cNvPr id="1490934994" name="Title 1"/>
+          <p:cNvPr id="1980779894" name="Title 1"/>
           <p:cNvSpPr>
             <a:spLocks noGrp="1"/>
           </p:cNvSpPr>
@@ -1061,7 +1061,7 @@
       </p:sp>
       <p:sp>
         <p:nvSpPr>
-          <p:cNvPr id="276522979" name="Subtitle 2"/>
+          <p:cNvPr id="718661916" name="Subtitle 2"/>
           <p:cNvSpPr>
             <a:spLocks noGrp="1"/>
           </p:cNvSpPr>
@@ -1129,7 +1129,7 @@
       </p:sp>
       <p:sp>
         <p:nvSpPr>
-          <p:cNvPr id="999915730" name="Date Placeholder 3"/>
+          <p:cNvPr id="680484504" name="Date Placeholder 3"/>
           <p:cNvSpPr>
             <a:spLocks noGrp="1"/>
           </p:cNvSpPr>
@@ -1155,7 +1155,7 @@
       </p:sp>
       <p:sp>
         <p:nvSpPr>
-          <p:cNvPr id="1065776305" name="Footer Placeholder 4"/>
+          <p:cNvPr id="658554997" name="Footer Placeholder 4"/>
           <p:cNvSpPr>
             <a:spLocks noGrp="1"/>
           </p:cNvSpPr>
@@ -1177,7 +1177,7 @@
       </p:sp>
       <p:sp>
         <p:nvSpPr>
-          <p:cNvPr id="1940182082" name="Slide Number Placeholder 5"/>
+          <p:cNvPr id="423221432" name="Slide Number Placeholder 5"/>
           <p:cNvSpPr>
             <a:spLocks noGrp="1"/>
           </p:cNvSpPr>
@@ -1228,7 +1228,7 @@
       </p:grpSpPr>
       <p:sp>
         <p:nvSpPr>
-          <p:cNvPr id="835699431" name="Title 1"/>
+          <p:cNvPr id="999333611" name="Title 1"/>
           <p:cNvSpPr>
             <a:spLocks noGrp="1"/>
           </p:cNvSpPr>
@@ -1254,7 +1254,7 @@
       </p:sp>
       <p:sp>
         <p:nvSpPr>
-          <p:cNvPr id="1703809158" name="Vertical Text Placeholder 2"/>
+          <p:cNvPr id="2091376455" name="Vertical Text Placeholder 2"/>
           <p:cNvSpPr>
             <a:spLocks noGrp="1"/>
           </p:cNvSpPr>
@@ -1320,7 +1320,7 @@
       </p:sp>
       <p:sp>
         <p:nvSpPr>
-          <p:cNvPr id="571109524" name="Date Placeholder 3"/>
+          <p:cNvPr id="1749762527" name="Date Placeholder 3"/>
           <p:cNvSpPr>
             <a:spLocks noGrp="1"/>
           </p:cNvSpPr>
@@ -1346,7 +1346,7 @@
       </p:sp>
       <p:sp>
         <p:nvSpPr>
-          <p:cNvPr id="351069580" name="Footer Placeholder 4"/>
+          <p:cNvPr id="767647049" name="Footer Placeholder 4"/>
           <p:cNvSpPr>
             <a:spLocks noGrp="1"/>
           </p:cNvSpPr>
@@ -1368,7 +1368,7 @@
       </p:sp>
       <p:sp>
         <p:nvSpPr>
-          <p:cNvPr id="1293046896" name="Slide Number Placeholder 5"/>
+          <p:cNvPr id="1242236970" name="Slide Number Placeholder 5"/>
           <p:cNvSpPr>
             <a:spLocks noGrp="1"/>
           </p:cNvSpPr>
@@ -1419,7 +1419,7 @@
       </p:grpSpPr>
       <p:sp>
         <p:nvSpPr>
-          <p:cNvPr id="1794992726" name="Vertical Title 1"/>
+          <p:cNvPr id="1551054130" name="Vertical Title 1"/>
           <p:cNvSpPr>
             <a:spLocks noGrp="1"/>
           </p:cNvSpPr>
@@ -1450,7 +1450,7 @@
       </p:sp>
       <p:sp>
         <p:nvSpPr>
-          <p:cNvPr id="1284680495" name="Vertical Text Placeholder 2"/>
+          <p:cNvPr id="670578921" name="Vertical Text Placeholder 2"/>
           <p:cNvSpPr>
             <a:spLocks noGrp="1"/>
           </p:cNvSpPr>
@@ -1521,7 +1521,7 @@
       </p:sp>
       <p:sp>
         <p:nvSpPr>
-          <p:cNvPr id="1137202785" name="Date Placeholder 3"/>
+          <p:cNvPr id="765983498" name="Date Placeholder 3"/>
           <p:cNvSpPr>
             <a:spLocks noGrp="1"/>
           </p:cNvSpPr>
@@ -1547,7 +1547,7 @@
       </p:sp>
       <p:sp>
         <p:nvSpPr>
-          <p:cNvPr id="901612465" name="Footer Placeholder 4"/>
+          <p:cNvPr id="550925920" name="Footer Placeholder 4"/>
           <p:cNvSpPr>
             <a:spLocks noGrp="1"/>
           </p:cNvSpPr>
@@ -1569,7 +1569,7 @@
       </p:sp>
       <p:sp>
         <p:nvSpPr>
-          <p:cNvPr id="768600722" name="Slide Number Placeholder 5"/>
+          <p:cNvPr id="2030876314" name="Slide Number Placeholder 5"/>
           <p:cNvSpPr>
             <a:spLocks noGrp="1"/>
           </p:cNvSpPr>
@@ -1620,7 +1620,7 @@
       </p:grpSpPr>
       <p:sp>
         <p:nvSpPr>
-          <p:cNvPr id="167838217" name="Title 1"/>
+          <p:cNvPr id="683612123" name="Title 1"/>
           <p:cNvSpPr>
             <a:spLocks noGrp="1"/>
           </p:cNvSpPr>
@@ -1646,7 +1646,7 @@
       </p:sp>
       <p:sp>
         <p:nvSpPr>
-          <p:cNvPr id="1359607028" name="Content Placeholder 2"/>
+          <p:cNvPr id="2027575843" name="Content Placeholder 2"/>
           <p:cNvSpPr>
             <a:spLocks noGrp="1"/>
           </p:cNvSpPr>
@@ -1712,7 +1712,7 @@
       </p:sp>
       <p:sp>
         <p:nvSpPr>
-          <p:cNvPr id="37566597" name="Date Placeholder 3"/>
+          <p:cNvPr id="1497962090" name="Date Placeholder 3"/>
           <p:cNvSpPr>
             <a:spLocks noGrp="1"/>
           </p:cNvSpPr>
@@ -1738,7 +1738,7 @@
       </p:sp>
       <p:sp>
         <p:nvSpPr>
-          <p:cNvPr id="245411906" name="Footer Placeholder 4"/>
+          <p:cNvPr id="1231232237" name="Footer Placeholder 4"/>
           <p:cNvSpPr>
             <a:spLocks noGrp="1"/>
           </p:cNvSpPr>
@@ -1760,7 +1760,7 @@
       </p:sp>
       <p:sp>
         <p:nvSpPr>
-          <p:cNvPr id="174697738" name="Slide Number Placeholder 5"/>
+          <p:cNvPr id="1115572823" name="Slide Number Placeholder 5"/>
           <p:cNvSpPr>
             <a:spLocks noGrp="1"/>
           </p:cNvSpPr>
@@ -1811,7 +1811,7 @@
       </p:grpSpPr>
       <p:sp>
         <p:nvSpPr>
-          <p:cNvPr id="738533116" name="Title 1"/>
+          <p:cNvPr id="1929596660" name="Title 1"/>
           <p:cNvSpPr>
             <a:spLocks noGrp="1"/>
           </p:cNvSpPr>
@@ -1846,7 +1846,7 @@
       </p:sp>
       <p:sp>
         <p:nvSpPr>
-          <p:cNvPr id="906230555" name="Text Placeholder 2"/>
+          <p:cNvPr id="842289233" name="Text Placeholder 2"/>
           <p:cNvSpPr>
             <a:spLocks noGrp="1"/>
           </p:cNvSpPr>
@@ -1966,7 +1966,7 @@
       </p:sp>
       <p:sp>
         <p:nvSpPr>
-          <p:cNvPr id="1483370259" name="Date Placeholder 3"/>
+          <p:cNvPr id="1160585295" name="Date Placeholder 3"/>
           <p:cNvSpPr>
             <a:spLocks noGrp="1"/>
           </p:cNvSpPr>
@@ -1992,7 +1992,7 @@
       </p:sp>
       <p:sp>
         <p:nvSpPr>
-          <p:cNvPr id="1643184439" name="Footer Placeholder 4"/>
+          <p:cNvPr id="289067617" name="Footer Placeholder 4"/>
           <p:cNvSpPr>
             <a:spLocks noGrp="1"/>
           </p:cNvSpPr>
@@ -2014,7 +2014,7 @@
       </p:sp>
       <p:sp>
         <p:nvSpPr>
-          <p:cNvPr id="936707832" name="Slide Number Placeholder 5"/>
+          <p:cNvPr id="216424243" name="Slide Number Placeholder 5"/>
           <p:cNvSpPr>
             <a:spLocks noGrp="1"/>
           </p:cNvSpPr>
@@ -2065,7 +2065,7 @@
       </p:grpSpPr>
       <p:sp>
         <p:nvSpPr>
-          <p:cNvPr id="249912041" name="Title 1"/>
+          <p:cNvPr id="1084572296" name="Title 1"/>
           <p:cNvSpPr>
             <a:spLocks noGrp="1"/>
           </p:cNvSpPr>
@@ -2091,7 +2091,7 @@
       </p:sp>
       <p:sp>
         <p:nvSpPr>
-          <p:cNvPr id="922650580" name="Content Placeholder 2"/>
+          <p:cNvPr id="500063728" name="Content Placeholder 2"/>
           <p:cNvSpPr>
             <a:spLocks noGrp="1"/>
           </p:cNvSpPr>
@@ -2162,7 +2162,7 @@
       </p:sp>
       <p:sp>
         <p:nvSpPr>
-          <p:cNvPr id="1425362490" name="Content Placeholder 3"/>
+          <p:cNvPr id="569050099" name="Content Placeholder 3"/>
           <p:cNvSpPr>
             <a:spLocks noGrp="1"/>
           </p:cNvSpPr>
@@ -2233,7 +2233,7 @@
       </p:sp>
       <p:sp>
         <p:nvSpPr>
-          <p:cNvPr id="938222148" name="Date Placeholder 4"/>
+          <p:cNvPr id="120587461" name="Date Placeholder 4"/>
           <p:cNvSpPr>
             <a:spLocks noGrp="1"/>
           </p:cNvSpPr>
@@ -2259,7 +2259,7 @@
       </p:sp>
       <p:sp>
         <p:nvSpPr>
-          <p:cNvPr id="2080491254" name="Footer Placeholder 5"/>
+          <p:cNvPr id="1571633439" name="Footer Placeholder 5"/>
           <p:cNvSpPr>
             <a:spLocks noGrp="1"/>
           </p:cNvSpPr>
@@ -2281,7 +2281,7 @@
       </p:sp>
       <p:sp>
         <p:nvSpPr>
-          <p:cNvPr id="55191054" name="Slide Number Placeholder 6"/>
+          <p:cNvPr id="999778288" name="Slide Number Placeholder 6"/>
           <p:cNvSpPr>
             <a:spLocks noGrp="1"/>
           </p:cNvSpPr>
@@ -2332,7 +2332,7 @@
       </p:grpSpPr>
       <p:sp>
         <p:nvSpPr>
-          <p:cNvPr id="520136351" name="Title 1"/>
+          <p:cNvPr id="2064613687" name="Title 1"/>
           <p:cNvSpPr>
             <a:spLocks noGrp="1"/>
           </p:cNvSpPr>
@@ -2363,7 +2363,7 @@
       </p:sp>
       <p:sp>
         <p:nvSpPr>
-          <p:cNvPr id="1208220029" name="Text Placeholder 2"/>
+          <p:cNvPr id="325315022" name="Text Placeholder 2"/>
           <p:cNvSpPr>
             <a:spLocks noGrp="1"/>
           </p:cNvSpPr>
@@ -2431,7 +2431,7 @@
       </p:sp>
       <p:sp>
         <p:nvSpPr>
-          <p:cNvPr id="1630299999" name="Content Placeholder 3"/>
+          <p:cNvPr id="1786913827" name="Content Placeholder 3"/>
           <p:cNvSpPr>
             <a:spLocks noGrp="1"/>
           </p:cNvSpPr>
@@ -2502,7 +2502,7 @@
       </p:sp>
       <p:sp>
         <p:nvSpPr>
-          <p:cNvPr id="495604937" name="Text Placeholder 4"/>
+          <p:cNvPr id="1118086181" name="Text Placeholder 4"/>
           <p:cNvSpPr>
             <a:spLocks noGrp="1"/>
           </p:cNvSpPr>
@@ -2570,7 +2570,7 @@
       </p:sp>
       <p:sp>
         <p:nvSpPr>
-          <p:cNvPr id="331971089" name="Content Placeholder 5"/>
+          <p:cNvPr id="1550211084" name="Content Placeholder 5"/>
           <p:cNvSpPr>
             <a:spLocks noGrp="1"/>
           </p:cNvSpPr>
@@ -2641,7 +2641,7 @@
       </p:sp>
       <p:sp>
         <p:nvSpPr>
-          <p:cNvPr id="489458300" name="Date Placeholder 6"/>
+          <p:cNvPr id="500577699" name="Date Placeholder 6"/>
           <p:cNvSpPr>
             <a:spLocks noGrp="1"/>
           </p:cNvSpPr>
@@ -2667,7 +2667,7 @@
       </p:sp>
       <p:sp>
         <p:nvSpPr>
-          <p:cNvPr id="160111729" name="Footer Placeholder 7"/>
+          <p:cNvPr id="746134792" name="Footer Placeholder 7"/>
           <p:cNvSpPr>
             <a:spLocks noGrp="1"/>
           </p:cNvSpPr>
@@ -2689,7 +2689,7 @@
       </p:sp>
       <p:sp>
         <p:nvSpPr>
-          <p:cNvPr id="1932191937" name="Slide Number Placeholder 8"/>
+          <p:cNvPr id="525901979" name="Slide Number Placeholder 8"/>
           <p:cNvSpPr>
             <a:spLocks noGrp="1"/>
           </p:cNvSpPr>
@@ -2740,7 +2740,7 @@
       </p:grpSpPr>
       <p:sp>
         <p:nvSpPr>
-          <p:cNvPr id="244291570" name="Title 1"/>
+          <p:cNvPr id="1822858201" name="Title 1"/>
           <p:cNvSpPr>
             <a:spLocks noGrp="1"/>
           </p:cNvSpPr>
@@ -2766,7 +2766,7 @@
       </p:sp>
       <p:sp>
         <p:nvSpPr>
-          <p:cNvPr id="1534985771" name="Date Placeholder 2"/>
+          <p:cNvPr id="669838865" name="Date Placeholder 2"/>
           <p:cNvSpPr>
             <a:spLocks noGrp="1"/>
           </p:cNvSpPr>
@@ -2792,7 +2792,7 @@
       </p:sp>
       <p:sp>
         <p:nvSpPr>
-          <p:cNvPr id="1835115276" name="Footer Placeholder 3"/>
+          <p:cNvPr id="551100366" name="Footer Placeholder 3"/>
           <p:cNvSpPr>
             <a:spLocks noGrp="1"/>
           </p:cNvSpPr>
@@ -2814,7 +2814,7 @@
       </p:sp>
       <p:sp>
         <p:nvSpPr>
-          <p:cNvPr id="1902946736" name="Slide Number Placeholder 4"/>
+          <p:cNvPr id="1373421371" name="Slide Number Placeholder 4"/>
           <p:cNvSpPr>
             <a:spLocks noGrp="1"/>
           </p:cNvSpPr>
@@ -2865,7 +2865,7 @@
       </p:grpSpPr>
       <p:sp>
         <p:nvSpPr>
-          <p:cNvPr id="767963413" name="Date Placeholder 1"/>
+          <p:cNvPr id="557333454" name="Date Placeholder 1"/>
           <p:cNvSpPr>
             <a:spLocks noGrp="1"/>
           </p:cNvSpPr>
@@ -2891,7 +2891,7 @@
       </p:sp>
       <p:sp>
         <p:nvSpPr>
-          <p:cNvPr id="1716532563" name="Footer Placeholder 2"/>
+          <p:cNvPr id="1005438738" name="Footer Placeholder 2"/>
           <p:cNvSpPr>
             <a:spLocks noGrp="1"/>
           </p:cNvSpPr>
@@ -2913,7 +2913,7 @@
       </p:sp>
       <p:sp>
         <p:nvSpPr>
-          <p:cNvPr id="714970969" name="Slide Number Placeholder 3"/>
+          <p:cNvPr id="514673879" name="Slide Number Placeholder 3"/>
           <p:cNvSpPr>
             <a:spLocks noGrp="1"/>
           </p:cNvSpPr>
@@ -2964,7 +2964,7 @@
       </p:grpSpPr>
       <p:sp>
         <p:nvSpPr>
-          <p:cNvPr id="549179193" name="Title 1"/>
+          <p:cNvPr id="1027448182" name="Title 1"/>
           <p:cNvSpPr>
             <a:spLocks noGrp="1"/>
           </p:cNvSpPr>
@@ -2999,7 +2999,7 @@
       </p:sp>
       <p:sp>
         <p:nvSpPr>
-          <p:cNvPr id="364565865" name="Content Placeholder 2"/>
+          <p:cNvPr id="1473893242" name="Content Placeholder 2"/>
           <p:cNvSpPr>
             <a:spLocks noGrp="1"/>
           </p:cNvSpPr>
@@ -3098,7 +3098,7 @@
       </p:sp>
       <p:sp>
         <p:nvSpPr>
-          <p:cNvPr id="317476436" name="Text Placeholder 3"/>
+          <p:cNvPr id="1124654024" name="Text Placeholder 3"/>
           <p:cNvSpPr>
             <a:spLocks noGrp="1"/>
           </p:cNvSpPr>
@@ -3166,7 +3166,7 @@
       </p:sp>
       <p:sp>
         <p:nvSpPr>
-          <p:cNvPr id="2057530399" name="Date Placeholder 4"/>
+          <p:cNvPr id="1886020371" name="Date Placeholder 4"/>
           <p:cNvSpPr>
             <a:spLocks noGrp="1"/>
           </p:cNvSpPr>
@@ -3192,7 +3192,7 @@
       </p:sp>
       <p:sp>
         <p:nvSpPr>
-          <p:cNvPr id="362911291" name="Footer Placeholder 5"/>
+          <p:cNvPr id="1365969715" name="Footer Placeholder 5"/>
           <p:cNvSpPr>
             <a:spLocks noGrp="1"/>
           </p:cNvSpPr>
@@ -3214,7 +3214,7 @@
       </p:sp>
       <p:sp>
         <p:nvSpPr>
-          <p:cNvPr id="2126141994" name="Slide Number Placeholder 6"/>
+          <p:cNvPr id="1278398274" name="Slide Number Placeholder 6"/>
           <p:cNvSpPr>
             <a:spLocks noGrp="1"/>
           </p:cNvSpPr>
@@ -3265,7 +3265,7 @@
       </p:grpSpPr>
       <p:sp>
         <p:nvSpPr>
-          <p:cNvPr id="1412930443" name="Title 1"/>
+          <p:cNvPr id="413982421" name="Title 1"/>
           <p:cNvSpPr>
             <a:spLocks noGrp="1"/>
           </p:cNvSpPr>
@@ -3300,7 +3300,7 @@
       </p:sp>
       <p:sp>
         <p:nvSpPr>
-          <p:cNvPr id="2056092311" name="Picture Placeholder 2"/>
+          <p:cNvPr id="1740868302" name="Picture Placeholder 2"/>
           <p:cNvSpPr>
             <a:spLocks noChangeAspect="1" noGrp="1"/>
           </p:cNvSpPr>
@@ -3368,7 +3368,7 @@
       </p:sp>
       <p:sp>
         <p:nvSpPr>
-          <p:cNvPr id="914559000" name="Text Placeholder 3"/>
+          <p:cNvPr id="2114051817" name="Text Placeholder 3"/>
           <p:cNvSpPr>
             <a:spLocks noGrp="1"/>
           </p:cNvSpPr>
@@ -3436,7 +3436,7 @@
       </p:sp>
       <p:sp>
         <p:nvSpPr>
-          <p:cNvPr id="1587891736" name="Date Placeholder 4"/>
+          <p:cNvPr id="309647202" name="Date Placeholder 4"/>
           <p:cNvSpPr>
             <a:spLocks noGrp="1"/>
           </p:cNvSpPr>
@@ -3462,7 +3462,7 @@
       </p:sp>
       <p:sp>
         <p:nvSpPr>
-          <p:cNvPr id="1166152871" name="Footer Placeholder 5"/>
+          <p:cNvPr id="1548656616" name="Footer Placeholder 5"/>
           <p:cNvSpPr>
             <a:spLocks noGrp="1"/>
           </p:cNvSpPr>
@@ -3484,7 +3484,7 @@
       </p:sp>
       <p:sp>
         <p:nvSpPr>
-          <p:cNvPr id="647472972" name="Slide Number Placeholder 6"/>
+          <p:cNvPr id="1845445203" name="Slide Number Placeholder 6"/>
           <p:cNvSpPr>
             <a:spLocks noGrp="1"/>
           </p:cNvSpPr>
@@ -3542,7 +3542,7 @@
       </p:grpSpPr>
       <p:sp>
         <p:nvSpPr>
-          <p:cNvPr id="604855965" name="Title Placeholder 1"/>
+          <p:cNvPr id="659792394" name="Title Placeholder 1"/>
           <p:cNvSpPr>
             <a:spLocks noGrp="1"/>
           </p:cNvSpPr>
@@ -3587,7 +3587,7 @@
       </p:sp>
       <p:sp>
         <p:nvSpPr>
-          <p:cNvPr id="1459868980" name="Text Placeholder 2"/>
+          <p:cNvPr id="88844599" name="Text Placeholder 2"/>
           <p:cNvSpPr>
             <a:spLocks noGrp="1"/>
           </p:cNvSpPr>
@@ -3699,7 +3699,7 @@
       </p:sp>
       <p:sp>
         <p:nvSpPr>
-          <p:cNvPr id="417889845" name="Date Placeholder 3"/>
+          <p:cNvPr id="734225236" name="Date Placeholder 3"/>
           <p:cNvSpPr>
             <a:spLocks noGrp="1"/>
           </p:cNvSpPr>
@@ -3741,7 +3741,7 @@
       </p:sp>
       <p:sp>
         <p:nvSpPr>
-          <p:cNvPr id="1348511816" name="Footer Placeholder 4"/>
+          <p:cNvPr id="980225971" name="Footer Placeholder 4"/>
           <p:cNvSpPr>
             <a:spLocks noGrp="1"/>
           </p:cNvSpPr>
@@ -3779,7 +3779,7 @@
       </p:sp>
       <p:sp>
         <p:nvSpPr>
-          <p:cNvPr id="1867732482" name="Slide Number Placeholder 5"/>
+          <p:cNvPr id="1874968269" name="Slide Number Placeholder 5"/>
           <p:cNvSpPr>
             <a:spLocks noGrp="1"/>
           </p:cNvSpPr>
@@ -4137,7 +4137,7 @@
       </p:grpSpPr>
       <p:sp>
         <p:nvSpPr>
-          <p:cNvPr id="312510771" name="Title 1"/>
+          <p:cNvPr id="1165622015" name="Title 1"/>
           <p:cNvSpPr>
             <a:spLocks noGrp="1"/>
           </p:cNvSpPr>
@@ -4170,7 +4170,7 @@
       </p:sp>
       <p:sp>
         <p:nvSpPr>
-          <p:cNvPr id="623938329" name="Subtitle 2"/>
+          <p:cNvPr id="1585353408" name="Subtitle 2"/>
           <p:cNvSpPr>
             <a:spLocks noGrp="1"/>
           </p:cNvSpPr>
@@ -4242,7 +4242,7 @@
       </p:grpSpPr>
       <p:sp>
         <p:nvSpPr>
-          <p:cNvPr id="1950968692" name="Title 1"/>
+          <p:cNvPr id="996138923" name="Title 1"/>
           <p:cNvSpPr>
             <a:spLocks noGrp="1"/>
           </p:cNvSpPr>
@@ -4281,7 +4281,7 @@
       </p:sp>
       <p:pic>
         <p:nvPicPr>
-          <p:cNvPr id="1079405938" name=""/>
+          <p:cNvPr id="896269778" name=""/>
           <p:cNvPicPr>
             <a:picLocks noChangeAspect="1"/>
           </p:cNvPicPr>
@@ -4307,7 +4307,7 @@
       </p:pic>
       <p:sp>
         <p:nvSpPr>
-          <p:cNvPr id="1426576431" name="Text Placeholder 3"/>
+          <p:cNvPr id="641985802" name="Text Placeholder 3"/>
           <p:cNvSpPr>
             <a:spLocks noGrp="1"/>
           </p:cNvSpPr>
@@ -4439,7 +4439,7 @@
       </p:grpSpPr>
       <p:sp>
         <p:nvSpPr>
-          <p:cNvPr id="1003961313" name="Title 1"/>
+          <p:cNvPr id="1238367262" name="Title 1"/>
           <p:cNvSpPr>
             <a:spLocks noGrp="1"/>
           </p:cNvSpPr>
@@ -4472,7 +4472,7 @@
       </p:sp>
       <p:sp>
         <p:nvSpPr>
-          <p:cNvPr id="490894256" name="Content Placeholder 2"/>
+          <p:cNvPr id="215576940" name="Content Placeholder 2"/>
           <p:cNvSpPr>
             <a:spLocks noGrp="1"/>
           </p:cNvSpPr>
@@ -4599,7 +4599,7 @@
       </p:grpSpPr>
       <p:sp>
         <p:nvSpPr>
-          <p:cNvPr id="1014102530" name="Title 1"/>
+          <p:cNvPr id="699111865" name="Title 1"/>
           <p:cNvSpPr>
             <a:spLocks noGrp="1"/>
           </p:cNvSpPr>
@@ -4643,7 +4643,7 @@
       </p:sp>
       <p:pic>
         <p:nvPicPr>
-          <p:cNvPr id="1686205466" name=""/>
+          <p:cNvPr id="1612604500" name=""/>
           <p:cNvPicPr>
             <a:picLocks noChangeAspect="1"/>
           </p:cNvPicPr>
@@ -4666,7 +4666,7 @@
       </p:pic>
       <p:sp>
         <p:nvSpPr>
-          <p:cNvPr id="462015654" name="Text Placeholder 3"/>
+          <p:cNvPr id="406457816" name="Text Placeholder 3"/>
           <p:cNvSpPr>
             <a:spLocks noGrp="1"/>
           </p:cNvSpPr>
@@ -4682,7 +4682,7 @@
         </p:spPr>
         <p:txBody>
           <a:bodyPr vertOverflow="overflow" horzOverflow="overflow" vert="horz" wrap="square" lIns="91440" tIns="45720" rIns="91440" bIns="45720" numCol="1" spcCol="0" rtlCol="0" fromWordArt="0" anchor="t" anchorCtr="0" forceAA="0" upright="0" compatLnSpc="0">
-            <a:normAutofit fontScale="95000" lnSpcReduction="1000"/>
+            <a:normAutofit/>
           </a:bodyPr>
           <a:lstStyle>
             <a:lvl1pPr marL="0" indent="0">
@@ -4727,7 +4727,7 @@
               <a:defRPr/>
             </a:pPr>
             <a:r>
-              <a:rPr lang="ru-RU" sz="2000" b="0" i="0" u="none" strike="noStrike" cap="none" spc="0">
+              <a:rPr lang="ru-RU" sz="1900" b="0" i="0" u="none" strike="noStrike" cap="none" spc="0">
                 <a:solidFill>
                   <a:srgbClr val="BAC2DE"/>
                 </a:solidFill>
@@ -4735,22 +4735,9 @@
                 <a:ea typeface="Arial"/>
                 <a:cs typeface="Arial"/>
               </a:rPr>
-              <a:t>• ZIP — быстрый и максимально поддерживаемый формат, но сжатие в среднем слабее.</a:t>
-            </a:r>
-            <a:endParaRPr lang="ru-RU" sz="2000" b="0" i="0" u="none" strike="noStrike" cap="none" spc="0">
-              <a:solidFill>
-                <a:srgbClr val="BAC2DE"/>
-              </a:solidFill>
-              <a:latin typeface="Arial"/>
-              <a:ea typeface="Arial"/>
-              <a:cs typeface="Arial"/>
-            </a:endParaRPr>
-          </a:p>
-          <a:p>
-            <a:pPr>
-              <a:defRPr/>
-            </a:pPr>
-            <a:endParaRPr sz="2000" b="0" i="0" u="none" strike="noStrike" cap="none" spc="0">
+              <a:t>• JPEG — хорош для фото, но крупнее и без прозрачности.</a:t>
+            </a:r>
+            <a:endParaRPr lang="ru-RU" sz="1900" b="0" i="0" u="none" strike="noStrike" cap="none" spc="0">
               <a:solidFill>
                 <a:srgbClr val="BAC2DE"/>
               </a:solidFill>
@@ -4763,7 +4750,7 @@
               <a:defRPr/>
             </a:pPr>
             <a:r>
-              <a:rPr lang="ru-RU" sz="2000" b="0" i="0" u="none" strike="noStrike" cap="none" spc="0">
+              <a:rPr lang="ru-RU" sz="1900" b="0" i="0" u="none" strike="noStrike" cap="none" spc="0">
                 <a:solidFill>
                   <a:srgbClr val="BAC2DE"/>
                 </a:solidFill>
@@ -4771,22 +4758,9 @@
                 <a:ea typeface="Arial"/>
                 <a:cs typeface="Arial"/>
               </a:rPr>
-              <a:t>• RAR — даёт хорошую плотность сжатия, но является проприетарным.</a:t>
-            </a:r>
-            <a:endParaRPr lang="ru-RU" sz="2000" b="0" i="0" u="none" strike="noStrike" cap="none" spc="0">
-              <a:solidFill>
-                <a:srgbClr val="BAC2DE"/>
-              </a:solidFill>
-              <a:latin typeface="Arial"/>
-              <a:ea typeface="Arial"/>
-              <a:cs typeface="Arial"/>
-            </a:endParaRPr>
-          </a:p>
-          <a:p>
-            <a:pPr>
-              <a:defRPr/>
-            </a:pPr>
-            <a:endParaRPr sz="2000" b="0" i="0" u="none" strike="noStrike" cap="none" spc="0">
+              <a:t>• PNG — отличная детализация и альфа-канал, но большие размеры.</a:t>
+            </a:r>
+            <a:endParaRPr lang="ru-RU" sz="1900" b="0" i="0" u="none" strike="noStrike" cap="none" spc="0">
               <a:solidFill>
                 <a:srgbClr val="BAC2DE"/>
               </a:solidFill>
@@ -4799,7 +4773,7 @@
               <a:defRPr/>
             </a:pPr>
             <a:r>
-              <a:rPr lang="ru-RU" sz="2000" b="0" i="0" u="none" strike="noStrike" cap="none" spc="0">
+              <a:rPr lang="ru-RU" sz="1900" b="0" i="0" u="none" strike="noStrike" cap="none" spc="0">
                 <a:solidFill>
                   <a:srgbClr val="BAC2DE"/>
                 </a:solidFill>
@@ -4807,7 +4781,30 @@
                 <a:ea typeface="Arial"/>
                 <a:cs typeface="Arial"/>
               </a:rPr>
-              <a:t>• 7z — обеспечивает лучшую компрессию, чем ZIP и часто лучше, чем RAR, при этом оставаясь открытым и бесплатным.</a:t>
+              <a:t>• GIF — простая анимация, но низкое цветовое качество.</a:t>
+            </a:r>
+            <a:endParaRPr lang="ru-RU" sz="1900" b="0" i="0" u="none" strike="noStrike" cap="none" spc="0">
+              <a:solidFill>
+                <a:srgbClr val="BAC2DE"/>
+              </a:solidFill>
+              <a:latin typeface="Arial"/>
+              <a:cs typeface="Arial"/>
+            </a:endParaRPr>
+          </a:p>
+          <a:p>
+            <a:pPr>
+              <a:defRPr/>
+            </a:pPr>
+            <a:r>
+              <a:rPr lang="ru-RU" sz="1900" b="0" i="0" u="none" strike="noStrike" cap="none" spc="0">
+                <a:solidFill>
+                  <a:srgbClr val="BAC2DE"/>
+                </a:solidFill>
+                <a:latin typeface="Arial"/>
+                <a:ea typeface="Arial"/>
+                <a:cs typeface="Arial"/>
+              </a:rPr>
+              <a:t>• WebP — сочетает преимущества всех трёх: меньше вес, высокое качество, прозрачность и</a:t>
             </a:r>
             <a:endParaRPr/>
           </a:p>
@@ -4848,7 +4845,7 @@
       </p:grpSpPr>
       <p:sp>
         <p:nvSpPr>
-          <p:cNvPr id="2081703178" name="Title 1"/>
+          <p:cNvPr id="2036334363" name="Title 1"/>
           <p:cNvSpPr>
             <a:spLocks noGrp="1"/>
           </p:cNvSpPr>
@@ -4890,7 +4887,7 @@
       </p:sp>
       <p:pic>
         <p:nvPicPr>
-          <p:cNvPr id="2074621493" name=""/>
+          <p:cNvPr id="1554504408" name=""/>
           <p:cNvPicPr>
             <a:picLocks noChangeAspect="1"/>
           </p:cNvPicPr>
@@ -4917,7 +4914,7 @@
       </p:pic>
       <p:sp>
         <p:nvSpPr>
-          <p:cNvPr id="759777864" name="Text Placeholder 3"/>
+          <p:cNvPr id="2059490885" name="Text Placeholder 3"/>
           <p:cNvSpPr>
             <a:spLocks noGrp="1"/>
           </p:cNvSpPr>
@@ -5184,7 +5181,7 @@
       </p:grpSpPr>
       <p:sp>
         <p:nvSpPr>
-          <p:cNvPr id="12920434" name="Title 1"/>
+          <p:cNvPr id="1978133648" name="Title 1"/>
           <p:cNvSpPr>
             <a:spLocks noGrp="1"/>
           </p:cNvSpPr>
@@ -5226,7 +5223,7 @@
       </p:sp>
       <p:sp>
         <p:nvSpPr>
-          <p:cNvPr id="1201090718" name="Subtitle 2"/>
+          <p:cNvPr id="1462051210" name="Subtitle 2"/>
           <p:cNvSpPr>
             <a:spLocks noGrp="1"/>
           </p:cNvSpPr>

</xml_diff>